<commit_message>
tidy up files and create presentation pdf
</commit_message>
<xml_diff>
--- a/Presentation_images/Pres1.pptx
+++ b/Presentation_images/Pres1.pptx
@@ -6,21 +6,12 @@
   </p:sldMasterIdLst>
   <p:sldIdLst>
     <p:sldId id="274" r:id="rId2"/>
-    <p:sldId id="275" r:id="rId3"/>
-    <p:sldId id="257" r:id="rId4"/>
-    <p:sldId id="268" r:id="rId5"/>
-    <p:sldId id="272" r:id="rId6"/>
-    <p:sldId id="270" r:id="rId7"/>
-    <p:sldId id="258" r:id="rId8"/>
-    <p:sldId id="262" r:id="rId9"/>
-    <p:sldId id="271" r:id="rId10"/>
-    <p:sldId id="263" r:id="rId11"/>
-    <p:sldId id="265" r:id="rId12"/>
-    <p:sldId id="267" r:id="rId13"/>
-    <p:sldId id="266" r:id="rId14"/>
-    <p:sldId id="259" r:id="rId15"/>
-    <p:sldId id="260" r:id="rId16"/>
-    <p:sldId id="261" r:id="rId17"/>
+    <p:sldId id="276" r:id="rId3"/>
+    <p:sldId id="272" r:id="rId4"/>
+    <p:sldId id="265" r:id="rId5"/>
+    <p:sldId id="258" r:id="rId6"/>
+    <p:sldId id="277" r:id="rId7"/>
+    <p:sldId id="278" r:id="rId8"/>
   </p:sldIdLst>
   <p:sldSz cx="12192000" cy="6858000"/>
   <p:notesSz cx="6858000" cy="9144000"/>
@@ -119,6 +110,11 @@
       </a:defRPr>
     </a:lvl9pPr>
   </p:defaultTextStyle>
+  <p:extLst>
+    <p:ext uri="{EFAFB233-063F-42B5-8137-9DF3F51BA10A}">
+      <p15:sldGuideLst xmlns:p15="http://schemas.microsoft.com/office/powerpoint/2012/main"/>
+    </p:ext>
+  </p:extLst>
 </p:presentation>
 </file>
 
@@ -3753,84 +3749,6 @@
       </p:grpSpPr>
       <p:pic>
         <p:nvPicPr>
-          <p:cNvPr id="3" name="Picture 2" descr="A picture containing text, way, scene, road&#10;&#10;Description automatically generated">
-            <a:extLst>
-              <a:ext uri="{FF2B5EF4-FFF2-40B4-BE49-F238E27FC236}">
-                <a16:creationId xmlns:a16="http://schemas.microsoft.com/office/drawing/2014/main" id="{9335B45E-AF7F-4C5B-AED8-522B374A4A5C}"/>
-              </a:ext>
-            </a:extLst>
-          </p:cNvPr>
-          <p:cNvPicPr>
-            <a:picLocks noChangeAspect="1"/>
-          </p:cNvPicPr>
-          <p:nvPr/>
-        </p:nvPicPr>
-        <p:blipFill>
-          <a:blip r:embed="rId2">
-            <a:extLst>
-              <a:ext uri="{28A0092B-C50C-407E-A947-70E740481C1C}">
-                <a14:useLocalDpi xmlns:a14="http://schemas.microsoft.com/office/drawing/2010/main" val="0"/>
-              </a:ext>
-            </a:extLst>
-          </a:blip>
-          <a:stretch>
-            <a:fillRect/>
-          </a:stretch>
-        </p:blipFill>
-        <p:spPr>
-          <a:xfrm>
-            <a:off x="3867150" y="1757362"/>
-            <a:ext cx="4457700" cy="3343275"/>
-          </a:xfrm>
-          <a:prstGeom prst="rect">
-            <a:avLst/>
-          </a:prstGeom>
-        </p:spPr>
-      </p:pic>
-      <p:sp>
-        <p:nvSpPr>
-          <p:cNvPr id="5" name="TextBox 4">
-            <a:extLst>
-              <a:ext uri="{FF2B5EF4-FFF2-40B4-BE49-F238E27FC236}">
-                <a16:creationId xmlns:a16="http://schemas.microsoft.com/office/drawing/2014/main" id="{64A48F2D-9ABD-4A35-A217-71C3302DD6F5}"/>
-              </a:ext>
-            </a:extLst>
-          </p:cNvPr>
-          <p:cNvSpPr txBox="1"/>
-          <p:nvPr/>
-        </p:nvSpPr>
-        <p:spPr>
-          <a:xfrm>
-            <a:off x="412376" y="380110"/>
-            <a:ext cx="6096000" cy="369332"/>
-          </a:xfrm>
-          <a:prstGeom prst="rect">
-            <a:avLst/>
-          </a:prstGeom>
-          <a:noFill/>
-        </p:spPr>
-        <p:txBody>
-          <a:bodyPr wrap="square">
-            <a:spAutoFit/>
-          </a:bodyPr>
-          <a:lstStyle/>
-          <a:p>
-            <a:pPr algn="l"/>
-            <a:r>
-              <a:rPr lang="en-US" b="1" i="0" dirty="0">
-                <a:solidFill>
-                  <a:srgbClr val="24292E"/>
-                </a:solidFill>
-                <a:effectLst/>
-                <a:latin typeface="-apple-system"/>
-              </a:rPr>
-              <a:t>Which factors contribute to accident risk?</a:t>
-            </a:r>
-          </a:p>
-        </p:txBody>
-      </p:sp>
-      <p:pic>
-        <p:nvPicPr>
           <p:cNvPr id="1026" name="Picture 2">
             <a:extLst>
               <a:ext uri="{FF2B5EF4-FFF2-40B4-BE49-F238E27FC236}">
@@ -3844,7 +3762,7 @@
           <p:nvPr/>
         </p:nvPicPr>
         <p:blipFill>
-          <a:blip r:embed="rId3">
+          <a:blip r:embed="rId2">
             <a:extLst>
               <a:ext uri="{28A0092B-C50C-407E-A947-70E740481C1C}">
                 <a14:useLocalDpi xmlns:a14="http://schemas.microsoft.com/office/drawing/2010/main" val="0"/>
@@ -3858,8 +3776,8 @@
         </p:blipFill>
         <p:spPr bwMode="auto">
           <a:xfrm>
-            <a:off x="381000" y="4086986"/>
-            <a:ext cx="4457700" cy="2332863"/>
+            <a:off x="4223530" y="2612363"/>
+            <a:ext cx="6897255" cy="3609563"/>
           </a:xfrm>
           <a:prstGeom prst="rect">
             <a:avLst/>
@@ -3876,42 +3794,12 @@
           </a:extLst>
         </p:spPr>
       </p:pic>
-    </p:spTree>
-    <p:extLst>
-      <p:ext uri="{BB962C8B-B14F-4D97-AF65-F5344CB8AC3E}">
-        <p14:creationId xmlns:p14="http://schemas.microsoft.com/office/powerpoint/2010/main" val="2755934640"/>
-      </p:ext>
-    </p:extLst>
-  </p:cSld>
-  <p:clrMapOvr>
-    <a:masterClrMapping/>
-  </p:clrMapOvr>
-</p:sld>
-</file>
-
-<file path=ppt/slides/slide10.xml><?xml version="1.0" encoding="utf-8"?>
-<p:sld xmlns:a="http://schemas.openxmlformats.org/drawingml/2006/main" xmlns:r="http://schemas.openxmlformats.org/officeDocument/2006/relationships" xmlns:p="http://schemas.openxmlformats.org/presentationml/2006/main">
-  <p:cSld>
-    <p:spTree>
-      <p:nvGrpSpPr>
-        <p:cNvPr id="1" name=""/>
-        <p:cNvGrpSpPr/>
-        <p:nvPr/>
-      </p:nvGrpSpPr>
-      <p:grpSpPr>
-        <a:xfrm>
-          <a:off x="0" y="0"/>
-          <a:ext cx="0" cy="0"/>
-          <a:chOff x="0" y="0"/>
-          <a:chExt cx="0" cy="0"/>
-        </a:xfrm>
-      </p:grpSpPr>
       <p:pic>
         <p:nvPicPr>
-          <p:cNvPr id="3" name="Picture 2" descr="Map&#10;&#10;Description automatically generated">
-            <a:extLst>
-              <a:ext uri="{FF2B5EF4-FFF2-40B4-BE49-F238E27FC236}">
-                <a16:creationId xmlns:a16="http://schemas.microsoft.com/office/drawing/2014/main" id="{9ED6502F-A1CB-44A0-9C78-77CB9DFB44E4}"/>
+          <p:cNvPr id="3" name="Picture 2" descr="A picture containing text, way, scene, road&#10;&#10;Description automatically generated">
+            <a:extLst>
+              <a:ext uri="{FF2B5EF4-FFF2-40B4-BE49-F238E27FC236}">
+                <a16:creationId xmlns:a16="http://schemas.microsoft.com/office/drawing/2014/main" id="{9335B45E-AF7F-4C5B-AED8-522B374A4A5C}"/>
               </a:ext>
             </a:extLst>
           </p:cNvPr>
@@ -3921,7 +3809,7 @@
           <p:nvPr/>
         </p:nvPicPr>
         <p:blipFill>
-          <a:blip r:embed="rId2">
+          <a:blip r:embed="rId3">
             <a:extLst>
               <a:ext uri="{28A0092B-C50C-407E-A947-70E740481C1C}">
                 <a14:useLocalDpi xmlns:a14="http://schemas.microsoft.com/office/drawing/2010/main" val="0"/>
@@ -3934,594 +3822,60 @@
         </p:blipFill>
         <p:spPr>
           <a:xfrm>
-            <a:off x="1409700" y="1595437"/>
-            <a:ext cx="9372600" cy="3667125"/>
+            <a:off x="1419140" y="1073870"/>
+            <a:ext cx="4457700" cy="3343275"/>
           </a:xfrm>
           <a:prstGeom prst="rect">
             <a:avLst/>
           </a:prstGeom>
         </p:spPr>
       </p:pic>
-    </p:spTree>
-    <p:extLst>
-      <p:ext uri="{BB962C8B-B14F-4D97-AF65-F5344CB8AC3E}">
-        <p14:creationId xmlns:p14="http://schemas.microsoft.com/office/powerpoint/2010/main" val="3322864479"/>
-      </p:ext>
-    </p:extLst>
-  </p:cSld>
-  <p:clrMapOvr>
-    <a:masterClrMapping/>
-  </p:clrMapOvr>
-</p:sld>
-</file>
-
-<file path=ppt/slides/slide11.xml><?xml version="1.0" encoding="utf-8"?>
-<p:sld xmlns:a="http://schemas.openxmlformats.org/drawingml/2006/main" xmlns:r="http://schemas.openxmlformats.org/officeDocument/2006/relationships" xmlns:p="http://schemas.openxmlformats.org/presentationml/2006/main">
-  <p:cSld>
-    <p:spTree>
-      <p:nvGrpSpPr>
-        <p:cNvPr id="1" name=""/>
-        <p:cNvGrpSpPr/>
-        <p:nvPr/>
-      </p:nvGrpSpPr>
-      <p:grpSpPr>
-        <a:xfrm>
-          <a:off x="0" y="0"/>
-          <a:ext cx="0" cy="0"/>
-          <a:chOff x="0" y="0"/>
-          <a:chExt cx="0" cy="0"/>
-        </a:xfrm>
-      </p:grpSpPr>
-      <p:pic>
-        <p:nvPicPr>
-          <p:cNvPr id="3" name="Picture 2" descr="Map&#10;&#10;Description automatically generated">
-            <a:extLst>
-              <a:ext uri="{FF2B5EF4-FFF2-40B4-BE49-F238E27FC236}">
-                <a16:creationId xmlns:a16="http://schemas.microsoft.com/office/drawing/2014/main" id="{B8477E2B-06B1-4C58-80FB-561A1F4236CC}"/>
-              </a:ext>
-            </a:extLst>
-          </p:cNvPr>
-          <p:cNvPicPr>
-            <a:picLocks noChangeAspect="1"/>
-          </p:cNvPicPr>
+      <p:sp>
+        <p:nvSpPr>
+          <p:cNvPr id="5" name="TextBox 4">
+            <a:extLst>
+              <a:ext uri="{FF2B5EF4-FFF2-40B4-BE49-F238E27FC236}">
+                <a16:creationId xmlns:a16="http://schemas.microsoft.com/office/drawing/2014/main" id="{64A48F2D-9ABD-4A35-A217-71C3302DD6F5}"/>
+              </a:ext>
+            </a:extLst>
+          </p:cNvPr>
+          <p:cNvSpPr txBox="1"/>
           <p:nvPr/>
-        </p:nvPicPr>
-        <p:blipFill>
-          <a:blip r:embed="rId2">
-            <a:extLst>
-              <a:ext uri="{28A0092B-C50C-407E-A947-70E740481C1C}">
-                <a14:useLocalDpi xmlns:a14="http://schemas.microsoft.com/office/drawing/2010/main" val="0"/>
-              </a:ext>
-            </a:extLst>
-          </a:blip>
-          <a:stretch>
-            <a:fillRect/>
-          </a:stretch>
-        </p:blipFill>
+        </p:nvSpPr>
         <p:spPr>
           <a:xfrm>
-            <a:off x="367297" y="3343564"/>
-            <a:ext cx="2738393" cy="3413768"/>
+            <a:off x="412376" y="380110"/>
+            <a:ext cx="6096000" cy="369332"/>
           </a:xfrm>
           <a:prstGeom prst="rect">
             <a:avLst/>
           </a:prstGeom>
+          <a:noFill/>
         </p:spPr>
-      </p:pic>
-      <p:pic>
-        <p:nvPicPr>
-          <p:cNvPr id="4" name="Picture 3" descr="Map&#10;&#10;Description automatically generated">
-            <a:extLst>
-              <a:ext uri="{FF2B5EF4-FFF2-40B4-BE49-F238E27FC236}">
-                <a16:creationId xmlns:a16="http://schemas.microsoft.com/office/drawing/2014/main" id="{337BA551-37BB-4DB8-8945-8C4A0A63F30C}"/>
-              </a:ext>
-            </a:extLst>
-          </p:cNvPr>
-          <p:cNvPicPr>
-            <a:picLocks noChangeAspect="1"/>
-          </p:cNvPicPr>
-          <p:nvPr/>
-        </p:nvPicPr>
-        <p:blipFill>
-          <a:blip r:embed="rId3">
-            <a:extLst>
-              <a:ext uri="{28A0092B-C50C-407E-A947-70E740481C1C}">
-                <a14:useLocalDpi xmlns:a14="http://schemas.microsoft.com/office/drawing/2010/main" val="0"/>
-              </a:ext>
-            </a:extLst>
-          </a:blip>
-          <a:stretch>
-            <a:fillRect/>
-          </a:stretch>
-        </p:blipFill>
-        <p:spPr>
-          <a:xfrm>
-            <a:off x="3558905" y="3343564"/>
-            <a:ext cx="8516486" cy="3332162"/>
-          </a:xfrm>
-          <a:prstGeom prst="rect">
-            <a:avLst/>
-          </a:prstGeom>
-        </p:spPr>
-      </p:pic>
-      <p:pic>
-        <p:nvPicPr>
-          <p:cNvPr id="5" name="Picture 4" descr="Chart, bar chart&#10;&#10;Description automatically generated">
-            <a:extLst>
-              <a:ext uri="{FF2B5EF4-FFF2-40B4-BE49-F238E27FC236}">
-                <a16:creationId xmlns:a16="http://schemas.microsoft.com/office/drawing/2014/main" id="{80BCDA14-BF6C-4CC3-9086-C266F9B6A8F5}"/>
-              </a:ext>
-            </a:extLst>
-          </p:cNvPr>
-          <p:cNvPicPr>
-            <a:picLocks noChangeAspect="1"/>
-          </p:cNvPicPr>
-          <p:nvPr/>
-        </p:nvPicPr>
-        <p:blipFill>
-          <a:blip r:embed="rId4">
-            <a:extLst>
-              <a:ext uri="{28A0092B-C50C-407E-A947-70E740481C1C}">
-                <a14:useLocalDpi xmlns:a14="http://schemas.microsoft.com/office/drawing/2010/main" val="0"/>
-              </a:ext>
-            </a:extLst>
-          </a:blip>
-          <a:stretch>
-            <a:fillRect/>
-          </a:stretch>
-        </p:blipFill>
-        <p:spPr>
-          <a:xfrm>
-            <a:off x="41526" y="790094"/>
-            <a:ext cx="6128327" cy="2553470"/>
-          </a:xfrm>
-          <a:prstGeom prst="rect">
-            <a:avLst/>
-          </a:prstGeom>
-        </p:spPr>
-      </p:pic>
-      <p:pic>
-        <p:nvPicPr>
-          <p:cNvPr id="6" name="Picture 5" descr="Chart, bar chart&#10;&#10;Description automatically generated">
-            <a:extLst>
-              <a:ext uri="{FF2B5EF4-FFF2-40B4-BE49-F238E27FC236}">
-                <a16:creationId xmlns:a16="http://schemas.microsoft.com/office/drawing/2014/main" id="{1F7CBC53-57B0-4BA8-87AC-21C5026B1BB9}"/>
-              </a:ext>
-            </a:extLst>
-          </p:cNvPr>
-          <p:cNvPicPr>
-            <a:picLocks noChangeAspect="1"/>
-          </p:cNvPicPr>
-          <p:nvPr/>
-        </p:nvPicPr>
-        <p:blipFill>
-          <a:blip r:embed="rId5">
-            <a:extLst>
-              <a:ext uri="{28A0092B-C50C-407E-A947-70E740481C1C}">
-                <a14:useLocalDpi xmlns:a14="http://schemas.microsoft.com/office/drawing/2010/main" val="0"/>
-              </a:ext>
-            </a:extLst>
-          </a:blip>
-          <a:stretch>
-            <a:fillRect/>
-          </a:stretch>
-        </p:blipFill>
-        <p:spPr>
-          <a:xfrm>
-            <a:off x="6063673" y="790094"/>
-            <a:ext cx="6128327" cy="2553470"/>
-          </a:xfrm>
-          <a:prstGeom prst="rect">
-            <a:avLst/>
-          </a:prstGeom>
-        </p:spPr>
-      </p:pic>
+        <p:txBody>
+          <a:bodyPr wrap="square">
+            <a:spAutoFit/>
+          </a:bodyPr>
+          <a:lstStyle/>
+          <a:p>
+            <a:pPr algn="l"/>
+            <a:r>
+              <a:rPr lang="en-US" b="1" i="0" dirty="0">
+                <a:solidFill>
+                  <a:srgbClr val="24292E"/>
+                </a:solidFill>
+                <a:effectLst/>
+                <a:latin typeface="-apple-system"/>
+              </a:rPr>
+              <a:t>Which factors contribute to accident risk?</a:t>
+            </a:r>
+          </a:p>
+        </p:txBody>
+      </p:sp>
     </p:spTree>
     <p:extLst>
       <p:ext uri="{BB962C8B-B14F-4D97-AF65-F5344CB8AC3E}">
-        <p14:creationId xmlns:p14="http://schemas.microsoft.com/office/powerpoint/2010/main" val="187437710"/>
-      </p:ext>
-    </p:extLst>
-  </p:cSld>
-  <p:clrMapOvr>
-    <a:masterClrMapping/>
-  </p:clrMapOvr>
-</p:sld>
-</file>
-
-<file path=ppt/slides/slide12.xml><?xml version="1.0" encoding="utf-8"?>
-<p:sld xmlns:a="http://schemas.openxmlformats.org/drawingml/2006/main" xmlns:r="http://schemas.openxmlformats.org/officeDocument/2006/relationships" xmlns:p="http://schemas.openxmlformats.org/presentationml/2006/main">
-  <p:cSld>
-    <p:spTree>
-      <p:nvGrpSpPr>
-        <p:cNvPr id="1" name=""/>
-        <p:cNvGrpSpPr/>
-        <p:nvPr/>
-      </p:nvGrpSpPr>
-      <p:grpSpPr>
-        <a:xfrm>
-          <a:off x="0" y="0"/>
-          <a:ext cx="0" cy="0"/>
-          <a:chOff x="0" y="0"/>
-          <a:chExt cx="0" cy="0"/>
-        </a:xfrm>
-      </p:grpSpPr>
-      <p:pic>
-        <p:nvPicPr>
-          <p:cNvPr id="3" name="Picture 2" descr="Chart, bar chart&#10;&#10;Description automatically generated">
-            <a:extLst>
-              <a:ext uri="{FF2B5EF4-FFF2-40B4-BE49-F238E27FC236}">
-                <a16:creationId xmlns:a16="http://schemas.microsoft.com/office/drawing/2014/main" id="{9D2B9E7E-4299-4484-845E-461FE12C2521}"/>
-              </a:ext>
-            </a:extLst>
-          </p:cNvPr>
-          <p:cNvPicPr>
-            <a:picLocks noChangeAspect="1"/>
-          </p:cNvPicPr>
-          <p:nvPr/>
-        </p:nvPicPr>
-        <p:blipFill>
-          <a:blip r:embed="rId2">
-            <a:extLst>
-              <a:ext uri="{28A0092B-C50C-407E-A947-70E740481C1C}">
-                <a14:useLocalDpi xmlns:a14="http://schemas.microsoft.com/office/drawing/2010/main" val="0"/>
-              </a:ext>
-            </a:extLst>
-          </a:blip>
-          <a:stretch>
-            <a:fillRect/>
-          </a:stretch>
-        </p:blipFill>
-        <p:spPr>
-          <a:xfrm>
-            <a:off x="155474" y="2623127"/>
-            <a:ext cx="3971565" cy="4234873"/>
-          </a:xfrm>
-          <a:prstGeom prst="rect">
-            <a:avLst/>
-          </a:prstGeom>
-        </p:spPr>
-      </p:pic>
-      <p:pic>
-        <p:nvPicPr>
-          <p:cNvPr id="4" name="Picture 3" descr="Chart, bar chart&#10;&#10;Description automatically generated">
-            <a:extLst>
-              <a:ext uri="{FF2B5EF4-FFF2-40B4-BE49-F238E27FC236}">
-                <a16:creationId xmlns:a16="http://schemas.microsoft.com/office/drawing/2014/main" id="{3DD58D54-EF3D-48BB-9B63-BC09AD96D66F}"/>
-              </a:ext>
-            </a:extLst>
-          </p:cNvPr>
-          <p:cNvPicPr>
-            <a:picLocks noChangeAspect="1"/>
-          </p:cNvPicPr>
-          <p:nvPr/>
-        </p:nvPicPr>
-        <p:blipFill>
-          <a:blip r:embed="rId3">
-            <a:extLst>
-              <a:ext uri="{28A0092B-C50C-407E-A947-70E740481C1C}">
-                <a14:useLocalDpi xmlns:a14="http://schemas.microsoft.com/office/drawing/2010/main" val="0"/>
-              </a:ext>
-            </a:extLst>
-          </a:blip>
-          <a:stretch>
-            <a:fillRect/>
-          </a:stretch>
-        </p:blipFill>
-        <p:spPr>
-          <a:xfrm>
-            <a:off x="4397515" y="2548299"/>
-            <a:ext cx="6869841" cy="3479365"/>
-          </a:xfrm>
-          <a:prstGeom prst="rect">
-            <a:avLst/>
-          </a:prstGeom>
-        </p:spPr>
-      </p:pic>
-    </p:spTree>
-    <p:extLst>
-      <p:ext uri="{BB962C8B-B14F-4D97-AF65-F5344CB8AC3E}">
-        <p14:creationId xmlns:p14="http://schemas.microsoft.com/office/powerpoint/2010/main" val="3003241258"/>
-      </p:ext>
-    </p:extLst>
-  </p:cSld>
-  <p:clrMapOvr>
-    <a:masterClrMapping/>
-  </p:clrMapOvr>
-</p:sld>
-</file>
-
-<file path=ppt/slides/slide13.xml><?xml version="1.0" encoding="utf-8"?>
-<p:sld xmlns:a="http://schemas.openxmlformats.org/drawingml/2006/main" xmlns:r="http://schemas.openxmlformats.org/officeDocument/2006/relationships" xmlns:p="http://schemas.openxmlformats.org/presentationml/2006/main">
-  <p:cSld>
-    <p:spTree>
-      <p:nvGrpSpPr>
-        <p:cNvPr id="1" name=""/>
-        <p:cNvGrpSpPr/>
-        <p:nvPr/>
-      </p:nvGrpSpPr>
-      <p:grpSpPr>
-        <a:xfrm>
-          <a:off x="0" y="0"/>
-          <a:ext cx="0" cy="0"/>
-          <a:chOff x="0" y="0"/>
-          <a:chExt cx="0" cy="0"/>
-        </a:xfrm>
-      </p:grpSpPr>
-      <p:pic>
-        <p:nvPicPr>
-          <p:cNvPr id="3" name="Picture 2" descr="Chart, bar chart&#10;&#10;Description automatically generated">
-            <a:extLst>
-              <a:ext uri="{FF2B5EF4-FFF2-40B4-BE49-F238E27FC236}">
-                <a16:creationId xmlns:a16="http://schemas.microsoft.com/office/drawing/2014/main" id="{A2DD4038-4364-43A0-AB37-90E25C0B1754}"/>
-              </a:ext>
-            </a:extLst>
-          </p:cNvPr>
-          <p:cNvPicPr>
-            <a:picLocks noChangeAspect="1"/>
-          </p:cNvPicPr>
-          <p:nvPr/>
-        </p:nvPicPr>
-        <p:blipFill>
-          <a:blip r:embed="rId2">
-            <a:extLst>
-              <a:ext uri="{28A0092B-C50C-407E-A947-70E740481C1C}">
-                <a14:useLocalDpi xmlns:a14="http://schemas.microsoft.com/office/drawing/2010/main" val="0"/>
-              </a:ext>
-            </a:extLst>
-          </a:blip>
-          <a:stretch>
-            <a:fillRect/>
-          </a:stretch>
-        </p:blipFill>
-        <p:spPr>
-          <a:xfrm>
-            <a:off x="3270498" y="1303016"/>
-            <a:ext cx="5651003" cy="4251968"/>
-          </a:xfrm>
-          <a:prstGeom prst="rect">
-            <a:avLst/>
-          </a:prstGeom>
-        </p:spPr>
-      </p:pic>
-    </p:spTree>
-    <p:extLst>
-      <p:ext uri="{BB962C8B-B14F-4D97-AF65-F5344CB8AC3E}">
-        <p14:creationId xmlns:p14="http://schemas.microsoft.com/office/powerpoint/2010/main" val="3468841514"/>
-      </p:ext>
-    </p:extLst>
-  </p:cSld>
-  <p:clrMapOvr>
-    <a:masterClrMapping/>
-  </p:clrMapOvr>
-</p:sld>
-</file>
-
-<file path=ppt/slides/slide14.xml><?xml version="1.0" encoding="utf-8"?>
-<p:sld xmlns:a="http://schemas.openxmlformats.org/drawingml/2006/main" xmlns:r="http://schemas.openxmlformats.org/officeDocument/2006/relationships" xmlns:p="http://schemas.openxmlformats.org/presentationml/2006/main">
-  <p:cSld>
-    <p:spTree>
-      <p:nvGrpSpPr>
-        <p:cNvPr id="1" name=""/>
-        <p:cNvGrpSpPr/>
-        <p:nvPr/>
-      </p:nvGrpSpPr>
-      <p:grpSpPr>
-        <a:xfrm>
-          <a:off x="0" y="0"/>
-          <a:ext cx="0" cy="0"/>
-          <a:chOff x="0" y="0"/>
-          <a:chExt cx="0" cy="0"/>
-        </a:xfrm>
-      </p:grpSpPr>
-      <p:pic>
-        <p:nvPicPr>
-          <p:cNvPr id="3" name="Picture 2" descr="Chart, pie chart&#10;&#10;Description automatically generated">
-            <a:extLst>
-              <a:ext uri="{FF2B5EF4-FFF2-40B4-BE49-F238E27FC236}">
-                <a16:creationId xmlns:a16="http://schemas.microsoft.com/office/drawing/2014/main" id="{CC8F5FAC-B597-4737-89F0-04437DDC52DD}"/>
-              </a:ext>
-            </a:extLst>
-          </p:cNvPr>
-          <p:cNvPicPr>
-            <a:picLocks noChangeAspect="1"/>
-          </p:cNvPicPr>
-          <p:nvPr/>
-        </p:nvPicPr>
-        <p:blipFill>
-          <a:blip r:embed="rId2">
-            <a:extLst>
-              <a:ext uri="{28A0092B-C50C-407E-A947-70E740481C1C}">
-                <a14:useLocalDpi xmlns:a14="http://schemas.microsoft.com/office/drawing/2010/main" val="0"/>
-              </a:ext>
-            </a:extLst>
-          </a:blip>
-          <a:stretch>
-            <a:fillRect/>
-          </a:stretch>
-        </p:blipFill>
-        <p:spPr>
-          <a:xfrm>
-            <a:off x="43451" y="0"/>
-            <a:ext cx="4528141" cy="5491471"/>
-          </a:xfrm>
-          <a:prstGeom prst="rect">
-            <a:avLst/>
-          </a:prstGeom>
-        </p:spPr>
-      </p:pic>
-      <p:pic>
-        <p:nvPicPr>
-          <p:cNvPr id="4" name="Picture 3" descr="Chart, bar chart&#10;&#10;Description automatically generated">
-            <a:extLst>
-              <a:ext uri="{FF2B5EF4-FFF2-40B4-BE49-F238E27FC236}">
-                <a16:creationId xmlns:a16="http://schemas.microsoft.com/office/drawing/2014/main" id="{67582FB3-D1A1-467B-99E4-BDFED1B9DBB6}"/>
-              </a:ext>
-            </a:extLst>
-          </p:cNvPr>
-          <p:cNvPicPr>
-            <a:picLocks noChangeAspect="1"/>
-          </p:cNvPicPr>
-          <p:nvPr/>
-        </p:nvPicPr>
-        <p:blipFill>
-          <a:blip r:embed="rId3">
-            <a:extLst>
-              <a:ext uri="{28A0092B-C50C-407E-A947-70E740481C1C}">
-                <a14:useLocalDpi xmlns:a14="http://schemas.microsoft.com/office/drawing/2010/main" val="0"/>
-              </a:ext>
-            </a:extLst>
-          </a:blip>
-          <a:stretch>
-            <a:fillRect/>
-          </a:stretch>
-        </p:blipFill>
-        <p:spPr>
-          <a:xfrm>
-            <a:off x="-29795" y="3001307"/>
-            <a:ext cx="4729956" cy="5028449"/>
-          </a:xfrm>
-          <a:prstGeom prst="rect">
-            <a:avLst/>
-          </a:prstGeom>
-        </p:spPr>
-      </p:pic>
-    </p:spTree>
-    <p:extLst>
-      <p:ext uri="{BB962C8B-B14F-4D97-AF65-F5344CB8AC3E}">
-        <p14:creationId xmlns:p14="http://schemas.microsoft.com/office/powerpoint/2010/main" val="3290411892"/>
-      </p:ext>
-    </p:extLst>
-  </p:cSld>
-  <p:clrMapOvr>
-    <a:masterClrMapping/>
-  </p:clrMapOvr>
-</p:sld>
-</file>
-
-<file path=ppt/slides/slide15.xml><?xml version="1.0" encoding="utf-8"?>
-<p:sld xmlns:a="http://schemas.openxmlformats.org/drawingml/2006/main" xmlns:r="http://schemas.openxmlformats.org/officeDocument/2006/relationships" xmlns:p="http://schemas.openxmlformats.org/presentationml/2006/main">
-  <p:cSld>
-    <p:spTree>
-      <p:nvGrpSpPr>
-        <p:cNvPr id="1" name=""/>
-        <p:cNvGrpSpPr/>
-        <p:nvPr/>
-      </p:nvGrpSpPr>
-      <p:grpSpPr>
-        <a:xfrm>
-          <a:off x="0" y="0"/>
-          <a:ext cx="0" cy="0"/>
-          <a:chOff x="0" y="0"/>
-          <a:chExt cx="0" cy="0"/>
-        </a:xfrm>
-      </p:grpSpPr>
-      <p:pic>
-        <p:nvPicPr>
-          <p:cNvPr id="3" name="Picture 2" descr="Chart, bar chart&#10;&#10;Description automatically generated">
-            <a:extLst>
-              <a:ext uri="{FF2B5EF4-FFF2-40B4-BE49-F238E27FC236}">
-                <a16:creationId xmlns:a16="http://schemas.microsoft.com/office/drawing/2014/main" id="{78A75223-4B8C-41E0-AF7E-3D4C95636295}"/>
-              </a:ext>
-            </a:extLst>
-          </p:cNvPr>
-          <p:cNvPicPr>
-            <a:picLocks noChangeAspect="1"/>
-          </p:cNvPicPr>
-          <p:nvPr/>
-        </p:nvPicPr>
-        <p:blipFill>
-          <a:blip r:embed="rId2">
-            <a:extLst>
-              <a:ext uri="{28A0092B-C50C-407E-A947-70E740481C1C}">
-                <a14:useLocalDpi xmlns:a14="http://schemas.microsoft.com/office/drawing/2010/main" val="0"/>
-              </a:ext>
-            </a:extLst>
-          </a:blip>
-          <a:stretch>
-            <a:fillRect/>
-          </a:stretch>
-        </p:blipFill>
-        <p:spPr>
-          <a:xfrm>
-            <a:off x="3270498" y="969259"/>
-            <a:ext cx="5651003" cy="4919482"/>
-          </a:xfrm>
-          <a:prstGeom prst="rect">
-            <a:avLst/>
-          </a:prstGeom>
-        </p:spPr>
-      </p:pic>
-    </p:spTree>
-    <p:extLst>
-      <p:ext uri="{BB962C8B-B14F-4D97-AF65-F5344CB8AC3E}">
-        <p14:creationId xmlns:p14="http://schemas.microsoft.com/office/powerpoint/2010/main" val="4178984245"/>
-      </p:ext>
-    </p:extLst>
-  </p:cSld>
-  <p:clrMapOvr>
-    <a:masterClrMapping/>
-  </p:clrMapOvr>
-</p:sld>
-</file>
-
-<file path=ppt/slides/slide16.xml><?xml version="1.0" encoding="utf-8"?>
-<p:sld xmlns:a="http://schemas.openxmlformats.org/drawingml/2006/main" xmlns:r="http://schemas.openxmlformats.org/officeDocument/2006/relationships" xmlns:p="http://schemas.openxmlformats.org/presentationml/2006/main">
-  <p:cSld>
-    <p:spTree>
-      <p:nvGrpSpPr>
-        <p:cNvPr id="1" name=""/>
-        <p:cNvGrpSpPr/>
-        <p:nvPr/>
-      </p:nvGrpSpPr>
-      <p:grpSpPr>
-        <a:xfrm>
-          <a:off x="0" y="0"/>
-          <a:ext cx="0" cy="0"/>
-          <a:chOff x="0" y="0"/>
-          <a:chExt cx="0" cy="0"/>
-        </a:xfrm>
-      </p:grpSpPr>
-      <p:pic>
-        <p:nvPicPr>
-          <p:cNvPr id="3" name="Picture 2" descr="Chart, bar chart&#10;&#10;Description automatically generated">
-            <a:extLst>
-              <a:ext uri="{FF2B5EF4-FFF2-40B4-BE49-F238E27FC236}">
-                <a16:creationId xmlns:a16="http://schemas.microsoft.com/office/drawing/2014/main" id="{738AD35D-AA12-4E1D-96D6-EF9D9B95E5CF}"/>
-              </a:ext>
-            </a:extLst>
-          </p:cNvPr>
-          <p:cNvPicPr>
-            <a:picLocks noChangeAspect="1"/>
-          </p:cNvPicPr>
-          <p:nvPr/>
-        </p:nvPicPr>
-        <p:blipFill>
-          <a:blip r:embed="rId2">
-            <a:extLst>
-              <a:ext uri="{28A0092B-C50C-407E-A947-70E740481C1C}">
-                <a14:useLocalDpi xmlns:a14="http://schemas.microsoft.com/office/drawing/2010/main" val="0"/>
-              </a:ext>
-            </a:extLst>
-          </a:blip>
-          <a:stretch>
-            <a:fillRect/>
-          </a:stretch>
-        </p:blipFill>
-        <p:spPr>
-          <a:xfrm>
-            <a:off x="1592699" y="492302"/>
-            <a:ext cx="5651003" cy="6007620"/>
-          </a:xfrm>
-          <a:prstGeom prst="rect">
-            <a:avLst/>
-          </a:prstGeom>
-        </p:spPr>
-      </p:pic>
-    </p:spTree>
-    <p:extLst>
-      <p:ext uri="{BB962C8B-B14F-4D97-AF65-F5344CB8AC3E}">
-        <p14:creationId xmlns:p14="http://schemas.microsoft.com/office/powerpoint/2010/main" val="1382733728"/>
+        <p14:creationId xmlns:p14="http://schemas.microsoft.com/office/powerpoint/2010/main" val="2755934640"/>
       </p:ext>
     </p:extLst>
   </p:cSld>
@@ -4548,12 +3902,84 @@
           <a:chExt cx="0" cy="0"/>
         </a:xfrm>
       </p:grpSpPr>
-      <p:sp>
-        <p:nvSpPr>
-          <p:cNvPr id="6" name="TextBox 5">
-            <a:extLst>
-              <a:ext uri="{FF2B5EF4-FFF2-40B4-BE49-F238E27FC236}">
-                <a16:creationId xmlns:a16="http://schemas.microsoft.com/office/drawing/2014/main" id="{152E4E28-840E-4F7D-A5B0-8B89D0035638}"/>
+      <p:pic>
+        <p:nvPicPr>
+          <p:cNvPr id="2" name="Picture 1" descr="Chart, bar chart&#10;&#10;Description automatically generated">
+            <a:extLst>
+              <a:ext uri="{FF2B5EF4-FFF2-40B4-BE49-F238E27FC236}">
+                <a16:creationId xmlns:a16="http://schemas.microsoft.com/office/drawing/2014/main" id="{430A50FE-20ED-4C5D-9A9B-76639B01D4E4}"/>
+              </a:ext>
+            </a:extLst>
+          </p:cNvPr>
+          <p:cNvPicPr>
+            <a:picLocks noChangeAspect="1"/>
+          </p:cNvPicPr>
+          <p:nvPr/>
+        </p:nvPicPr>
+        <p:blipFill>
+          <a:blip r:embed="rId2">
+            <a:extLst>
+              <a:ext uri="{28A0092B-C50C-407E-A947-70E740481C1C}">
+                <a14:useLocalDpi xmlns:a14="http://schemas.microsoft.com/office/drawing/2010/main" val="0"/>
+              </a:ext>
+            </a:extLst>
+          </a:blip>
+          <a:stretch>
+            <a:fillRect/>
+          </a:stretch>
+        </p:blipFill>
+        <p:spPr>
+          <a:xfrm>
+            <a:off x="643467" y="2675414"/>
+            <a:ext cx="5294716" cy="3428329"/>
+          </a:xfrm>
+          <a:prstGeom prst="rect">
+            <a:avLst/>
+          </a:prstGeom>
+        </p:spPr>
+      </p:pic>
+      <p:pic>
+        <p:nvPicPr>
+          <p:cNvPr id="3" name="Picture 2" descr="Chart, bar chart&#10;&#10;Description automatically generated">
+            <a:extLst>
+              <a:ext uri="{FF2B5EF4-FFF2-40B4-BE49-F238E27FC236}">
+                <a16:creationId xmlns:a16="http://schemas.microsoft.com/office/drawing/2014/main" id="{F194175B-4498-4941-B26A-6EBA0807D703}"/>
+              </a:ext>
+            </a:extLst>
+          </p:cNvPr>
+          <p:cNvPicPr>
+            <a:picLocks noChangeAspect="1"/>
+          </p:cNvPicPr>
+          <p:nvPr/>
+        </p:nvPicPr>
+        <p:blipFill>
+          <a:blip r:embed="rId3">
+            <a:extLst>
+              <a:ext uri="{28A0092B-C50C-407E-A947-70E740481C1C}">
+                <a14:useLocalDpi xmlns:a14="http://schemas.microsoft.com/office/drawing/2010/main" val="0"/>
+              </a:ext>
+            </a:extLst>
+          </a:blip>
+          <a:stretch>
+            <a:fillRect/>
+          </a:stretch>
+        </p:blipFill>
+        <p:spPr>
+          <a:xfrm>
+            <a:off x="6253817" y="2567705"/>
+            <a:ext cx="5294715" cy="3517563"/>
+          </a:xfrm>
+          <a:prstGeom prst="rect">
+            <a:avLst/>
+          </a:prstGeom>
+        </p:spPr>
+      </p:pic>
+      <p:sp>
+        <p:nvSpPr>
+          <p:cNvPr id="4" name="TextBox 3">
+            <a:extLst>
+              <a:ext uri="{FF2B5EF4-FFF2-40B4-BE49-F238E27FC236}">
+                <a16:creationId xmlns:a16="http://schemas.microsoft.com/office/drawing/2014/main" id="{2BCAA1C9-A815-494D-86C8-B0107B2A3D05}"/>
               </a:ext>
             </a:extLst>
           </p:cNvPr>
@@ -4562,8 +3988,8 @@
         </p:nvSpPr>
         <p:spPr>
           <a:xfrm>
-            <a:off x="3048000" y="2417820"/>
-            <a:ext cx="6096000" cy="2031325"/>
+            <a:off x="412376" y="380110"/>
+            <a:ext cx="6096000" cy="369332"/>
           </a:xfrm>
           <a:prstGeom prst="rect">
             <a:avLst/>
@@ -4585,54 +4011,51 @@
                 <a:effectLst/>
                 <a:latin typeface="-apple-system"/>
               </a:rPr>
-              <a:t>Hypothesis 1: Younger drivers are involved in more accidents</a:t>
-            </a:r>
-          </a:p>
-          <a:p>
-            <a:pPr algn="l"/>
-            <a:r>
-              <a:rPr lang="en-US" b="1" i="0" dirty="0">
-                <a:solidFill>
-                  <a:srgbClr val="24292E"/>
-                </a:solidFill>
-                <a:effectLst/>
-                <a:latin typeface="-apple-system"/>
-              </a:rPr>
-              <a:t>Hypothesis 2: Driving on a weekday has no affect on the number of accidents.</a:t>
-            </a:r>
-          </a:p>
-          <a:p>
-            <a:pPr algn="l"/>
-            <a:r>
-              <a:rPr lang="en-US" b="1" i="0" dirty="0">
-                <a:solidFill>
-                  <a:srgbClr val="24292E"/>
-                </a:solidFill>
-                <a:effectLst/>
-                <a:latin typeface="-apple-system"/>
-              </a:rPr>
-              <a:t>Hypothesis 3: Higher speed limit increases the number of accidents</a:t>
-            </a:r>
-          </a:p>
-          <a:p>
-            <a:pPr algn="l"/>
-            <a:r>
-              <a:rPr lang="en-US" b="1" i="0" dirty="0">
-                <a:solidFill>
-                  <a:srgbClr val="24292E"/>
-                </a:solidFill>
-                <a:effectLst/>
-                <a:latin typeface="-apple-system"/>
-              </a:rPr>
-              <a:t>Hypothesis 4: There are more accidents when the weather conditions are bad</a:t>
-            </a:r>
-          </a:p>
-        </p:txBody>
-      </p:sp>
+              <a:t>Is it volume of traffic?</a:t>
+            </a:r>
+          </a:p>
+        </p:txBody>
+      </p:sp>
+      <p:pic>
+        <p:nvPicPr>
+          <p:cNvPr id="6" name="Picture 5" descr="Graphical user interface, text, application, table&#10;&#10;Description automatically generated">
+            <a:extLst>
+              <a:ext uri="{FF2B5EF4-FFF2-40B4-BE49-F238E27FC236}">
+                <a16:creationId xmlns:a16="http://schemas.microsoft.com/office/drawing/2014/main" id="{33243735-1FBD-436C-B8AA-B20E43205C21}"/>
+              </a:ext>
+            </a:extLst>
+          </p:cNvPr>
+          <p:cNvPicPr>
+            <a:picLocks noChangeAspect="1"/>
+          </p:cNvPicPr>
+          <p:nvPr/>
+        </p:nvPicPr>
+        <p:blipFill>
+          <a:blip r:embed="rId4">
+            <a:extLst>
+              <a:ext uri="{28A0092B-C50C-407E-A947-70E740481C1C}">
+                <a14:useLocalDpi xmlns:a14="http://schemas.microsoft.com/office/drawing/2010/main" val="0"/>
+              </a:ext>
+            </a:extLst>
+          </a:blip>
+          <a:stretch>
+            <a:fillRect/>
+          </a:stretch>
+        </p:blipFill>
+        <p:spPr>
+          <a:xfrm>
+            <a:off x="543996" y="900827"/>
+            <a:ext cx="3033023" cy="1623201"/>
+          </a:xfrm>
+          <a:prstGeom prst="rect">
+            <a:avLst/>
+          </a:prstGeom>
+        </p:spPr>
+      </p:pic>
     </p:spTree>
     <p:extLst>
       <p:ext uri="{BB962C8B-B14F-4D97-AF65-F5344CB8AC3E}">
-        <p14:creationId xmlns:p14="http://schemas.microsoft.com/office/powerpoint/2010/main" val="2916939468"/>
+        <p14:creationId xmlns:p14="http://schemas.microsoft.com/office/powerpoint/2010/main" val="1779737204"/>
       </p:ext>
     </p:extLst>
   </p:cSld>
@@ -4661,10 +4084,10 @@
       </p:grpSpPr>
       <p:pic>
         <p:nvPicPr>
-          <p:cNvPr id="3" name="Picture 2" descr="Chart, bar chart&#10;&#10;Description automatically generated">
-            <a:extLst>
-              <a:ext uri="{FF2B5EF4-FFF2-40B4-BE49-F238E27FC236}">
-                <a16:creationId xmlns:a16="http://schemas.microsoft.com/office/drawing/2014/main" id="{CE1B8842-F9CC-42B9-8E52-C71D1CB9A0AB}"/>
+          <p:cNvPr id="4" name="Picture 3" descr="Chart, bar chart, histogram&#10;&#10;Description automatically generated">
+            <a:extLst>
+              <a:ext uri="{FF2B5EF4-FFF2-40B4-BE49-F238E27FC236}">
+                <a16:creationId xmlns:a16="http://schemas.microsoft.com/office/drawing/2014/main" id="{A9A3F357-8DDF-4375-857A-00C0338CFA14}"/>
               </a:ext>
             </a:extLst>
           </p:cNvPr>
@@ -4687,20 +4110,62 @@
         </p:blipFill>
         <p:spPr>
           <a:xfrm>
-            <a:off x="6861037" y="1303016"/>
-            <a:ext cx="5330963" cy="4251968"/>
+            <a:off x="198068" y="1042639"/>
+            <a:ext cx="5385827" cy="5733299"/>
           </a:xfrm>
           <a:prstGeom prst="rect">
             <a:avLst/>
           </a:prstGeom>
         </p:spPr>
       </p:pic>
+      <p:sp>
+        <p:nvSpPr>
+          <p:cNvPr id="5" name="TextBox 4">
+            <a:extLst>
+              <a:ext uri="{FF2B5EF4-FFF2-40B4-BE49-F238E27FC236}">
+                <a16:creationId xmlns:a16="http://schemas.microsoft.com/office/drawing/2014/main" id="{6A46B1B8-753E-46B1-BB4D-A2317F5E5B00}"/>
+              </a:ext>
+            </a:extLst>
+          </p:cNvPr>
+          <p:cNvSpPr txBox="1"/>
+          <p:nvPr/>
+        </p:nvSpPr>
+        <p:spPr>
+          <a:xfrm>
+            <a:off x="412376" y="380110"/>
+            <a:ext cx="6096000" cy="369332"/>
+          </a:xfrm>
+          <a:prstGeom prst="rect">
+            <a:avLst/>
+          </a:prstGeom>
+          <a:noFill/>
+        </p:spPr>
+        <p:txBody>
+          <a:bodyPr wrap="square">
+            <a:spAutoFit/>
+          </a:bodyPr>
+          <a:lstStyle/>
+          <a:p>
+            <a:pPr algn="l"/>
+            <a:r>
+              <a:rPr lang="en-US" b="1" i="0" dirty="0">
+                <a:solidFill>
+                  <a:srgbClr val="24292E"/>
+                </a:solidFill>
+                <a:effectLst/>
+                <a:latin typeface="-apple-system"/>
+              </a:rPr>
+              <a:t>Is it where you are?</a:t>
+            </a:r>
+          </a:p>
+        </p:txBody>
+      </p:sp>
       <p:pic>
         <p:nvPicPr>
-          <p:cNvPr id="5" name="Picture 4" descr="Chart, bar chart&#10;&#10;Description automatically generated">
-            <a:extLst>
-              <a:ext uri="{FF2B5EF4-FFF2-40B4-BE49-F238E27FC236}">
-                <a16:creationId xmlns:a16="http://schemas.microsoft.com/office/drawing/2014/main" id="{24B63030-51FD-4057-BB1A-A149C548AE71}"/>
+          <p:cNvPr id="6" name="Picture 5" descr="Chart, line chart&#10;&#10;Description automatically generated">
+            <a:extLst>
+              <a:ext uri="{FF2B5EF4-FFF2-40B4-BE49-F238E27FC236}">
+                <a16:creationId xmlns:a16="http://schemas.microsoft.com/office/drawing/2014/main" id="{81BCFF9E-0AA3-4722-86A3-F2B2C310DFF6}"/>
               </a:ext>
             </a:extLst>
           </p:cNvPr>
@@ -4723,8 +4188,8 @@
         </p:blipFill>
         <p:spPr>
           <a:xfrm>
-            <a:off x="581086" y="1315114"/>
-            <a:ext cx="5651003" cy="4251968"/>
+            <a:off x="5631873" y="886691"/>
+            <a:ext cx="6560127" cy="4373418"/>
           </a:xfrm>
           <a:prstGeom prst="rect">
             <a:avLst/>
@@ -4734,7 +4199,7 @@
     </p:spTree>
     <p:extLst>
       <p:ext uri="{BB962C8B-B14F-4D97-AF65-F5344CB8AC3E}">
-        <p14:creationId xmlns:p14="http://schemas.microsoft.com/office/powerpoint/2010/main" val="2409718943"/>
+        <p14:creationId xmlns:p14="http://schemas.microsoft.com/office/powerpoint/2010/main" val="2259076554"/>
       </p:ext>
     </p:extLst>
   </p:cSld>
@@ -4763,10 +4228,10 @@
       </p:grpSpPr>
       <p:pic>
         <p:nvPicPr>
-          <p:cNvPr id="3" name="Picture 2" descr="Graphical user interface, text, application, table&#10;&#10;Description automatically generated">
-            <a:extLst>
-              <a:ext uri="{FF2B5EF4-FFF2-40B4-BE49-F238E27FC236}">
-                <a16:creationId xmlns:a16="http://schemas.microsoft.com/office/drawing/2014/main" id="{012F0DCB-C757-4304-BDC3-E17C87B0B84B}"/>
+          <p:cNvPr id="3" name="Picture 2" descr="Map&#10;&#10;Description automatically generated">
+            <a:extLst>
+              <a:ext uri="{FF2B5EF4-FFF2-40B4-BE49-F238E27FC236}">
+                <a16:creationId xmlns:a16="http://schemas.microsoft.com/office/drawing/2014/main" id="{B8477E2B-06B1-4C58-80FB-561A1F4236CC}"/>
               </a:ext>
             </a:extLst>
           </p:cNvPr>
@@ -4789,18 +4254,168 @@
         </p:blipFill>
         <p:spPr>
           <a:xfrm>
-            <a:off x="4579488" y="2617399"/>
-            <a:ext cx="6734434" cy="3604107"/>
+            <a:off x="367297" y="3343564"/>
+            <a:ext cx="2738393" cy="3413768"/>
           </a:xfrm>
           <a:prstGeom prst="rect">
             <a:avLst/>
           </a:prstGeom>
         </p:spPr>
       </p:pic>
+      <p:pic>
+        <p:nvPicPr>
+          <p:cNvPr id="4" name="Picture 3" descr="Map&#10;&#10;Description automatically generated">
+            <a:extLst>
+              <a:ext uri="{FF2B5EF4-FFF2-40B4-BE49-F238E27FC236}">
+                <a16:creationId xmlns:a16="http://schemas.microsoft.com/office/drawing/2014/main" id="{337BA551-37BB-4DB8-8945-8C4A0A63F30C}"/>
+              </a:ext>
+            </a:extLst>
+          </p:cNvPr>
+          <p:cNvPicPr>
+            <a:picLocks noChangeAspect="1"/>
+          </p:cNvPicPr>
+          <p:nvPr/>
+        </p:nvPicPr>
+        <p:blipFill>
+          <a:blip r:embed="rId3">
+            <a:extLst>
+              <a:ext uri="{28A0092B-C50C-407E-A947-70E740481C1C}">
+                <a14:useLocalDpi xmlns:a14="http://schemas.microsoft.com/office/drawing/2010/main" val="0"/>
+              </a:ext>
+            </a:extLst>
+          </a:blip>
+          <a:stretch>
+            <a:fillRect/>
+          </a:stretch>
+        </p:blipFill>
+        <p:spPr>
+          <a:xfrm>
+            <a:off x="3558905" y="3343564"/>
+            <a:ext cx="8516486" cy="3332162"/>
+          </a:xfrm>
+          <a:prstGeom prst="rect">
+            <a:avLst/>
+          </a:prstGeom>
+        </p:spPr>
+      </p:pic>
+      <p:pic>
+        <p:nvPicPr>
+          <p:cNvPr id="5" name="Picture 4" descr="Chart, bar chart&#10;&#10;Description automatically generated">
+            <a:extLst>
+              <a:ext uri="{FF2B5EF4-FFF2-40B4-BE49-F238E27FC236}">
+                <a16:creationId xmlns:a16="http://schemas.microsoft.com/office/drawing/2014/main" id="{80BCDA14-BF6C-4CC3-9086-C266F9B6A8F5}"/>
+              </a:ext>
+            </a:extLst>
+          </p:cNvPr>
+          <p:cNvPicPr>
+            <a:picLocks noChangeAspect="1"/>
+          </p:cNvPicPr>
+          <p:nvPr/>
+        </p:nvPicPr>
+        <p:blipFill>
+          <a:blip r:embed="rId4">
+            <a:extLst>
+              <a:ext uri="{28A0092B-C50C-407E-A947-70E740481C1C}">
+                <a14:useLocalDpi xmlns:a14="http://schemas.microsoft.com/office/drawing/2010/main" val="0"/>
+              </a:ext>
+            </a:extLst>
+          </a:blip>
+          <a:stretch>
+            <a:fillRect/>
+          </a:stretch>
+        </p:blipFill>
+        <p:spPr>
+          <a:xfrm>
+            <a:off x="41526" y="790094"/>
+            <a:ext cx="6128327" cy="2553470"/>
+          </a:xfrm>
+          <a:prstGeom prst="rect">
+            <a:avLst/>
+          </a:prstGeom>
+        </p:spPr>
+      </p:pic>
+      <p:pic>
+        <p:nvPicPr>
+          <p:cNvPr id="6" name="Picture 5" descr="Chart, bar chart&#10;&#10;Description automatically generated">
+            <a:extLst>
+              <a:ext uri="{FF2B5EF4-FFF2-40B4-BE49-F238E27FC236}">
+                <a16:creationId xmlns:a16="http://schemas.microsoft.com/office/drawing/2014/main" id="{1F7CBC53-57B0-4BA8-87AC-21C5026B1BB9}"/>
+              </a:ext>
+            </a:extLst>
+          </p:cNvPr>
+          <p:cNvPicPr>
+            <a:picLocks noChangeAspect="1"/>
+          </p:cNvPicPr>
+          <p:nvPr/>
+        </p:nvPicPr>
+        <p:blipFill>
+          <a:blip r:embed="rId5">
+            <a:extLst>
+              <a:ext uri="{28A0092B-C50C-407E-A947-70E740481C1C}">
+                <a14:useLocalDpi xmlns:a14="http://schemas.microsoft.com/office/drawing/2010/main" val="0"/>
+              </a:ext>
+            </a:extLst>
+          </a:blip>
+          <a:stretch>
+            <a:fillRect/>
+          </a:stretch>
+        </p:blipFill>
+        <p:spPr>
+          <a:xfrm>
+            <a:off x="6063673" y="790094"/>
+            <a:ext cx="6128327" cy="2553470"/>
+          </a:xfrm>
+          <a:prstGeom prst="rect">
+            <a:avLst/>
+          </a:prstGeom>
+        </p:spPr>
+      </p:pic>
+      <p:sp>
+        <p:nvSpPr>
+          <p:cNvPr id="7" name="TextBox 6">
+            <a:extLst>
+              <a:ext uri="{FF2B5EF4-FFF2-40B4-BE49-F238E27FC236}">
+                <a16:creationId xmlns:a16="http://schemas.microsoft.com/office/drawing/2014/main" id="{27E15324-4753-4791-9AE4-BD4E4B556CA5}"/>
+              </a:ext>
+            </a:extLst>
+          </p:cNvPr>
+          <p:cNvSpPr txBox="1"/>
+          <p:nvPr/>
+        </p:nvSpPr>
+        <p:spPr>
+          <a:xfrm>
+            <a:off x="412376" y="380110"/>
+            <a:ext cx="6096000" cy="369332"/>
+          </a:xfrm>
+          <a:prstGeom prst="rect">
+            <a:avLst/>
+          </a:prstGeom>
+          <a:noFill/>
+        </p:spPr>
+        <p:txBody>
+          <a:bodyPr wrap="square">
+            <a:spAutoFit/>
+          </a:bodyPr>
+          <a:lstStyle/>
+          <a:p>
+            <a:pPr algn="l"/>
+            <a:r>
+              <a:rPr lang="en-US" b="1" i="0" dirty="0">
+                <a:solidFill>
+                  <a:srgbClr val="24292E"/>
+                </a:solidFill>
+                <a:effectLst/>
+                <a:latin typeface="-apple-system"/>
+              </a:rPr>
+              <a:t>Is it where you are?</a:t>
+            </a:r>
+          </a:p>
+        </p:txBody>
+      </p:sp>
     </p:spTree>
     <p:extLst>
       <p:ext uri="{BB962C8B-B14F-4D97-AF65-F5344CB8AC3E}">
-        <p14:creationId xmlns:p14="http://schemas.microsoft.com/office/powerpoint/2010/main" val="1152575516"/>
+        <p14:creationId xmlns:p14="http://schemas.microsoft.com/office/powerpoint/2010/main" val="971223891"/>
       </p:ext>
     </p:extLst>
   </p:cSld>
@@ -4829,10 +4444,10 @@
       </p:grpSpPr>
       <p:pic>
         <p:nvPicPr>
-          <p:cNvPr id="3" name="Picture 2" descr="Chart, bar chart&#10;&#10;Description automatically generated">
-            <a:extLst>
-              <a:ext uri="{FF2B5EF4-FFF2-40B4-BE49-F238E27FC236}">
-                <a16:creationId xmlns:a16="http://schemas.microsoft.com/office/drawing/2014/main" id="{F558A308-7B68-465F-B70D-D799A531E388}"/>
+          <p:cNvPr id="3" name="Picture 2" descr="Chart, line chart&#10;&#10;Description automatically generated">
+            <a:extLst>
+              <a:ext uri="{FF2B5EF4-FFF2-40B4-BE49-F238E27FC236}">
+                <a16:creationId xmlns:a16="http://schemas.microsoft.com/office/drawing/2014/main" id="{AEA085B2-01F6-45A2-A372-D984A188F6C2}"/>
               </a:ext>
             </a:extLst>
           </p:cNvPr>
@@ -4855,8 +4470,86 @@
         </p:blipFill>
         <p:spPr>
           <a:xfrm>
-            <a:off x="2661079" y="1689317"/>
-            <a:ext cx="6869841" cy="3479365"/>
+            <a:off x="1366980" y="3357371"/>
+            <a:ext cx="9797143" cy="6858000"/>
+          </a:xfrm>
+          <a:prstGeom prst="rect">
+            <a:avLst/>
+          </a:prstGeom>
+        </p:spPr>
+      </p:pic>
+      <p:sp>
+        <p:nvSpPr>
+          <p:cNvPr id="4" name="TextBox 3">
+            <a:extLst>
+              <a:ext uri="{FF2B5EF4-FFF2-40B4-BE49-F238E27FC236}">
+                <a16:creationId xmlns:a16="http://schemas.microsoft.com/office/drawing/2014/main" id="{74CFB74C-9D88-4874-AC87-F80907B94A0B}"/>
+              </a:ext>
+            </a:extLst>
+          </p:cNvPr>
+          <p:cNvSpPr txBox="1"/>
+          <p:nvPr/>
+        </p:nvSpPr>
+        <p:spPr>
+          <a:xfrm>
+            <a:off x="412376" y="380110"/>
+            <a:ext cx="6096000" cy="369332"/>
+          </a:xfrm>
+          <a:prstGeom prst="rect">
+            <a:avLst/>
+          </a:prstGeom>
+          <a:noFill/>
+        </p:spPr>
+        <p:txBody>
+          <a:bodyPr wrap="square">
+            <a:spAutoFit/>
+          </a:bodyPr>
+          <a:lstStyle/>
+          <a:p>
+            <a:pPr algn="l"/>
+            <a:r>
+              <a:rPr lang="en-US" b="1" i="0" dirty="0">
+                <a:solidFill>
+                  <a:srgbClr val="24292E"/>
+                </a:solidFill>
+                <a:effectLst/>
+                <a:latin typeface="-apple-system"/>
+              </a:rPr>
+              <a:t>Is it the time of day, or the day of the week?</a:t>
+            </a:r>
+          </a:p>
+        </p:txBody>
+      </p:sp>
+      <p:pic>
+        <p:nvPicPr>
+          <p:cNvPr id="5" name="Picture 4" descr="Chart, bar chart&#10;&#10;Description automatically generated">
+            <a:extLst>
+              <a:ext uri="{FF2B5EF4-FFF2-40B4-BE49-F238E27FC236}">
+                <a16:creationId xmlns:a16="http://schemas.microsoft.com/office/drawing/2014/main" id="{BB488331-B0B7-46B7-BE32-553B91C2BD62}"/>
+              </a:ext>
+            </a:extLst>
+          </p:cNvPr>
+          <p:cNvPicPr>
+            <a:picLocks noChangeAspect="1"/>
+          </p:cNvPicPr>
+          <p:nvPr/>
+        </p:nvPicPr>
+        <p:blipFill>
+          <a:blip r:embed="rId3">
+            <a:extLst>
+              <a:ext uri="{28A0092B-C50C-407E-A947-70E740481C1C}">
+                <a14:useLocalDpi xmlns:a14="http://schemas.microsoft.com/office/drawing/2010/main" val="0"/>
+              </a:ext>
+            </a:extLst>
+          </a:blip>
+          <a:stretch>
+            <a:fillRect/>
+          </a:stretch>
+        </p:blipFill>
+        <p:spPr>
+          <a:xfrm>
+            <a:off x="6196378" y="11737"/>
+            <a:ext cx="4036487" cy="3435739"/>
           </a:xfrm>
           <a:prstGeom prst="rect">
             <a:avLst/>
@@ -4866,7 +4559,7 @@
     </p:spTree>
     <p:extLst>
       <p:ext uri="{BB962C8B-B14F-4D97-AF65-F5344CB8AC3E}">
-        <p14:creationId xmlns:p14="http://schemas.microsoft.com/office/powerpoint/2010/main" val="3078037602"/>
+        <p14:creationId xmlns:p14="http://schemas.microsoft.com/office/powerpoint/2010/main" val="116577400"/>
       </p:ext>
     </p:extLst>
   </p:cSld>
@@ -4893,12 +4586,54 @@
           <a:chExt cx="0" cy="0"/>
         </a:xfrm>
       </p:grpSpPr>
+      <p:sp>
+        <p:nvSpPr>
+          <p:cNvPr id="4" name="TextBox 3">
+            <a:extLst>
+              <a:ext uri="{FF2B5EF4-FFF2-40B4-BE49-F238E27FC236}">
+                <a16:creationId xmlns:a16="http://schemas.microsoft.com/office/drawing/2014/main" id="{74CFB74C-9D88-4874-AC87-F80907B94A0B}"/>
+              </a:ext>
+            </a:extLst>
+          </p:cNvPr>
+          <p:cNvSpPr txBox="1"/>
+          <p:nvPr/>
+        </p:nvSpPr>
+        <p:spPr>
+          <a:xfrm>
+            <a:off x="412376" y="380110"/>
+            <a:ext cx="6096000" cy="369332"/>
+          </a:xfrm>
+          <a:prstGeom prst="rect">
+            <a:avLst/>
+          </a:prstGeom>
+          <a:noFill/>
+        </p:spPr>
+        <p:txBody>
+          <a:bodyPr wrap="square">
+            <a:spAutoFit/>
+          </a:bodyPr>
+          <a:lstStyle/>
+          <a:p>
+            <a:pPr algn="l"/>
+            <a:r>
+              <a:rPr lang="en-US" b="1" i="0" dirty="0">
+                <a:solidFill>
+                  <a:srgbClr val="24292E"/>
+                </a:solidFill>
+                <a:effectLst/>
+                <a:latin typeface="-apple-system"/>
+              </a:rPr>
+              <a:t>Is it the gender or age of the driver?</a:t>
+            </a:r>
+          </a:p>
+        </p:txBody>
+      </p:sp>
       <p:pic>
         <p:nvPicPr>
-          <p:cNvPr id="3" name="Picture 2" descr="Chart, line chart&#10;&#10;Description automatically generated">
-            <a:extLst>
-              <a:ext uri="{FF2B5EF4-FFF2-40B4-BE49-F238E27FC236}">
-                <a16:creationId xmlns:a16="http://schemas.microsoft.com/office/drawing/2014/main" id="{F76E836B-12D7-4350-80CA-B89678209085}"/>
+          <p:cNvPr id="8" name="Picture 7" descr="Chart, bar chart&#10;&#10;Description automatically generated">
+            <a:extLst>
+              <a:ext uri="{FF2B5EF4-FFF2-40B4-BE49-F238E27FC236}">
+                <a16:creationId xmlns:a16="http://schemas.microsoft.com/office/drawing/2014/main" id="{C339B723-8681-4769-ACB4-E69B757843AB}"/>
               </a:ext>
             </a:extLst>
           </p:cNvPr>
@@ -4921,8 +4656,44 @@
         </p:blipFill>
         <p:spPr>
           <a:xfrm>
-            <a:off x="952500" y="0"/>
-            <a:ext cx="10287000" cy="6858000"/>
+            <a:off x="5921334" y="850380"/>
+            <a:ext cx="5651003" cy="6007620"/>
+          </a:xfrm>
+          <a:prstGeom prst="rect">
+            <a:avLst/>
+          </a:prstGeom>
+        </p:spPr>
+      </p:pic>
+      <p:pic>
+        <p:nvPicPr>
+          <p:cNvPr id="10" name="Picture 9" descr="Chart, pie chart&#10;&#10;Description automatically generated">
+            <a:extLst>
+              <a:ext uri="{FF2B5EF4-FFF2-40B4-BE49-F238E27FC236}">
+                <a16:creationId xmlns:a16="http://schemas.microsoft.com/office/drawing/2014/main" id="{2CA2147C-3821-4B27-BDF5-1C26F992F391}"/>
+              </a:ext>
+            </a:extLst>
+          </p:cNvPr>
+          <p:cNvPicPr>
+            <a:picLocks noChangeAspect="1"/>
+          </p:cNvPicPr>
+          <p:nvPr/>
+        </p:nvPicPr>
+        <p:blipFill>
+          <a:blip r:embed="rId3">
+            <a:extLst>
+              <a:ext uri="{28A0092B-C50C-407E-A947-70E740481C1C}">
+                <a14:useLocalDpi xmlns:a14="http://schemas.microsoft.com/office/drawing/2010/main" val="0"/>
+              </a:ext>
+            </a:extLst>
+          </a:blip>
+          <a:stretch>
+            <a:fillRect/>
+          </a:stretch>
+        </p:blipFill>
+        <p:spPr>
+          <a:xfrm>
+            <a:off x="266384" y="1016000"/>
+            <a:ext cx="5654950" cy="6858000"/>
           </a:xfrm>
           <a:prstGeom prst="rect">
             <a:avLst/>
@@ -4932,7 +4703,7 @@
     </p:spTree>
     <p:extLst>
       <p:ext uri="{BB962C8B-B14F-4D97-AF65-F5344CB8AC3E}">
-        <p14:creationId xmlns:p14="http://schemas.microsoft.com/office/powerpoint/2010/main" val="1287305687"/>
+        <p14:creationId xmlns:p14="http://schemas.microsoft.com/office/powerpoint/2010/main" val="2989961921"/>
       </p:ext>
     </p:extLst>
   </p:cSld>
@@ -4961,10 +4732,10 @@
       </p:grpSpPr>
       <p:pic>
         <p:nvPicPr>
-          <p:cNvPr id="3" name="Picture 2" descr="Chart, line chart&#10;&#10;Description automatically generated">
-            <a:extLst>
-              <a:ext uri="{FF2B5EF4-FFF2-40B4-BE49-F238E27FC236}">
-                <a16:creationId xmlns:a16="http://schemas.microsoft.com/office/drawing/2014/main" id="{AEA085B2-01F6-45A2-A372-D984A188F6C2}"/>
+          <p:cNvPr id="2" name="Picture 1" descr="Chart, bar chart&#10;&#10;Description automatically generated">
+            <a:extLst>
+              <a:ext uri="{FF2B5EF4-FFF2-40B4-BE49-F238E27FC236}">
+                <a16:creationId xmlns:a16="http://schemas.microsoft.com/office/drawing/2014/main" id="{BDEB5664-3C67-4E4F-8544-FCA47DFC4882}"/>
               </a:ext>
             </a:extLst>
           </p:cNvPr>
@@ -4987,50 +4758,20 @@
         </p:blipFill>
         <p:spPr>
           <a:xfrm>
-            <a:off x="1197428" y="0"/>
-            <a:ext cx="9797143" cy="6858000"/>
+            <a:off x="83117" y="3264075"/>
+            <a:ext cx="6869841" cy="3479365"/>
           </a:xfrm>
           <a:prstGeom prst="rect">
             <a:avLst/>
           </a:prstGeom>
         </p:spPr>
       </p:pic>
-    </p:spTree>
-    <p:extLst>
-      <p:ext uri="{BB962C8B-B14F-4D97-AF65-F5344CB8AC3E}">
-        <p14:creationId xmlns:p14="http://schemas.microsoft.com/office/powerpoint/2010/main" val="116577400"/>
-      </p:ext>
-    </p:extLst>
-  </p:cSld>
-  <p:clrMapOvr>
-    <a:masterClrMapping/>
-  </p:clrMapOvr>
-</p:sld>
-</file>
-
-<file path=ppt/slides/slide8.xml><?xml version="1.0" encoding="utf-8"?>
-<p:sld xmlns:a="http://schemas.openxmlformats.org/drawingml/2006/main" xmlns:r="http://schemas.openxmlformats.org/officeDocument/2006/relationships" xmlns:p="http://schemas.openxmlformats.org/presentationml/2006/main">
-  <p:cSld>
-    <p:spTree>
-      <p:nvGrpSpPr>
-        <p:cNvPr id="1" name=""/>
-        <p:cNvGrpSpPr/>
-        <p:nvPr/>
-      </p:nvGrpSpPr>
-      <p:grpSpPr>
-        <a:xfrm>
-          <a:off x="0" y="0"/>
-          <a:ext cx="0" cy="0"/>
-          <a:chOff x="0" y="0"/>
-          <a:chExt cx="0" cy="0"/>
-        </a:xfrm>
-      </p:grpSpPr>
       <p:pic>
         <p:nvPicPr>
-          <p:cNvPr id="3" name="Picture 2" descr="Chart, bar chart&#10;&#10;Description automatically generated">
-            <a:extLst>
-              <a:ext uri="{FF2B5EF4-FFF2-40B4-BE49-F238E27FC236}">
-                <a16:creationId xmlns:a16="http://schemas.microsoft.com/office/drawing/2014/main" id="{919111B5-3B2D-4CC2-A04E-1E48927A5A95}"/>
+          <p:cNvPr id="4" name="Picture 3">
+            <a:extLst>
+              <a:ext uri="{FF2B5EF4-FFF2-40B4-BE49-F238E27FC236}">
+                <a16:creationId xmlns:a16="http://schemas.microsoft.com/office/drawing/2014/main" id="{F8ADE2F3-4109-488F-9F91-258C30FA81C4}"/>
               </a:ext>
             </a:extLst>
           </p:cNvPr>
@@ -5040,7 +4781,7 @@
           <p:nvPr/>
         </p:nvPicPr>
         <p:blipFill>
-          <a:blip r:embed="rId2">
+          <a:blip r:embed="rId3">
             <a:extLst>
               <a:ext uri="{28A0092B-C50C-407E-A947-70E740481C1C}">
                 <a14:useLocalDpi xmlns:a14="http://schemas.microsoft.com/office/drawing/2010/main" val="0"/>
@@ -5053,84 +4794,80 @@
         </p:blipFill>
         <p:spPr>
           <a:xfrm>
-            <a:off x="1981200" y="1714500"/>
-            <a:ext cx="8229600" cy="3429000"/>
+            <a:off x="6952958" y="1169295"/>
+            <a:ext cx="5227566" cy="5574145"/>
           </a:xfrm>
           <a:prstGeom prst="rect">
             <a:avLst/>
           </a:prstGeom>
         </p:spPr>
       </p:pic>
-    </p:spTree>
-    <p:extLst>
-      <p:ext uri="{BB962C8B-B14F-4D97-AF65-F5344CB8AC3E}">
-        <p14:creationId xmlns:p14="http://schemas.microsoft.com/office/powerpoint/2010/main" val="2910093018"/>
-      </p:ext>
-    </p:extLst>
-  </p:cSld>
-  <p:clrMapOvr>
-    <a:masterClrMapping/>
-  </p:clrMapOvr>
-</p:sld>
-</file>
-
-<file path=ppt/slides/slide9.xml><?xml version="1.0" encoding="utf-8"?>
-<p:sld xmlns:a="http://schemas.openxmlformats.org/drawingml/2006/main" xmlns:r="http://schemas.openxmlformats.org/officeDocument/2006/relationships" xmlns:p="http://schemas.openxmlformats.org/presentationml/2006/main">
-  <p:cSld>
-    <p:spTree>
-      <p:nvGrpSpPr>
-        <p:cNvPr id="1" name=""/>
-        <p:cNvGrpSpPr/>
-        <p:nvPr/>
-      </p:nvGrpSpPr>
-      <p:grpSpPr>
-        <a:xfrm>
-          <a:off x="0" y="0"/>
-          <a:ext cx="0" cy="0"/>
-          <a:chOff x="0" y="0"/>
-          <a:chExt cx="0" cy="0"/>
-        </a:xfrm>
-      </p:grpSpPr>
-      <p:pic>
-        <p:nvPicPr>
-          <p:cNvPr id="3" name="Picture 2" descr="Chart, bar chart&#10;&#10;Description automatically generated">
-            <a:extLst>
-              <a:ext uri="{FF2B5EF4-FFF2-40B4-BE49-F238E27FC236}">
-                <a16:creationId xmlns:a16="http://schemas.microsoft.com/office/drawing/2014/main" id="{C0BB35FA-291A-4735-89C1-A5E65771D402}"/>
-              </a:ext>
-            </a:extLst>
-          </p:cNvPr>
-          <p:cNvPicPr>
-            <a:picLocks noChangeAspect="1"/>
-          </p:cNvPicPr>
+      <p:sp>
+        <p:nvSpPr>
+          <p:cNvPr id="5" name="TextBox 4">
+            <a:extLst>
+              <a:ext uri="{FF2B5EF4-FFF2-40B4-BE49-F238E27FC236}">
+                <a16:creationId xmlns:a16="http://schemas.microsoft.com/office/drawing/2014/main" id="{DB08F3D1-067E-408B-88CE-6053EC917A41}"/>
+              </a:ext>
+            </a:extLst>
+          </p:cNvPr>
+          <p:cNvSpPr txBox="1"/>
           <p:nvPr/>
-        </p:nvPicPr>
-        <p:blipFill>
-          <a:blip r:embed="rId2">
-            <a:extLst>
-              <a:ext uri="{28A0092B-C50C-407E-A947-70E740481C1C}">
-                <a14:useLocalDpi xmlns:a14="http://schemas.microsoft.com/office/drawing/2010/main" val="0"/>
-              </a:ext>
-            </a:extLst>
-          </a:blip>
-          <a:stretch>
-            <a:fillRect/>
-          </a:stretch>
-        </p:blipFill>
+        </p:nvSpPr>
         <p:spPr>
           <a:xfrm>
-            <a:off x="1981200" y="1714500"/>
-            <a:ext cx="8229600" cy="3429000"/>
+            <a:off x="412376" y="380110"/>
+            <a:ext cx="6096000" cy="369332"/>
           </a:xfrm>
           <a:prstGeom prst="rect">
             <a:avLst/>
           </a:prstGeom>
+          <a:noFill/>
         </p:spPr>
-      </p:pic>
+        <p:txBody>
+          <a:bodyPr wrap="square">
+            <a:spAutoFit/>
+          </a:bodyPr>
+          <a:lstStyle/>
+          <a:p>
+            <a:pPr algn="l"/>
+            <a:r>
+              <a:rPr lang="en-US" b="1" i="0" dirty="0">
+                <a:solidFill>
+                  <a:srgbClr val="24292E"/>
+                </a:solidFill>
+                <a:effectLst/>
+                <a:latin typeface="-apple-system"/>
+              </a:rPr>
+              <a:t>Is it the </a:t>
+            </a:r>
+            <a:r>
+              <a:rPr lang="en-US" b="1" i="0" dirty="0" err="1">
+                <a:solidFill>
+                  <a:srgbClr val="24292E"/>
+                </a:solidFill>
+                <a:effectLst/>
+                <a:latin typeface="-apple-system"/>
+              </a:rPr>
+              <a:t>manoeuvre</a:t>
+            </a:r>
+            <a:r>
+              <a:rPr lang="en-US" b="1" i="0" dirty="0">
+                <a:solidFill>
+                  <a:srgbClr val="24292E"/>
+                </a:solidFill>
+                <a:effectLst/>
+                <a:latin typeface="-apple-system"/>
+              </a:rPr>
+              <a:t> or the location on the road?</a:t>
+            </a:r>
+          </a:p>
+        </p:txBody>
+      </p:sp>
     </p:spTree>
     <p:extLst>
       <p:ext uri="{BB962C8B-B14F-4D97-AF65-F5344CB8AC3E}">
-        <p14:creationId xmlns:p14="http://schemas.microsoft.com/office/powerpoint/2010/main" val="475862583"/>
+        <p14:creationId xmlns:p14="http://schemas.microsoft.com/office/powerpoint/2010/main" val="227139849"/>
       </p:ext>
     </p:extLst>
   </p:cSld>

</xml_diff>